<commit_message>
updated final version of powerpoint
</commit_message>
<xml_diff>
--- a/Endpresentation.pptx
+++ b/Endpresentation.pptx
@@ -5,7 +5,7 @@
     <p:sldMasterId id="2147483648" r:id="rId1"/>
   </p:sldMasterIdLst>
   <p:notesMasterIdLst>
-    <p:notesMasterId r:id="rId13"/>
+    <p:notesMasterId r:id="rId14"/>
   </p:notesMasterIdLst>
   <p:sldIdLst>
     <p:sldId id="256" r:id="rId2"/>
@@ -15,10 +15,11 @@
     <p:sldId id="267" r:id="rId6"/>
     <p:sldId id="265" r:id="rId7"/>
     <p:sldId id="266" r:id="rId8"/>
-    <p:sldId id="258" r:id="rId9"/>
-    <p:sldId id="259" r:id="rId10"/>
-    <p:sldId id="260" r:id="rId11"/>
-    <p:sldId id="261" r:id="rId12"/>
+    <p:sldId id="268" r:id="rId9"/>
+    <p:sldId id="258" r:id="rId10"/>
+    <p:sldId id="259" r:id="rId11"/>
+    <p:sldId id="260" r:id="rId12"/>
+    <p:sldId id="261" r:id="rId13"/>
   </p:sldIdLst>
   <p:sldSz cx="12192000" cy="6858000"/>
   <p:notesSz cx="6858000" cy="9144000"/>
@@ -535,7 +536,7 @@
           <a:p>
             <a:fld id="{738E15E0-FA14-469F-BB41-5D207DD9574D}" type="slidenum">
               <a:rPr lang="en-NL" smtClean="0"/>
-              <a:t>9</a:t>
+              <a:t>10</a:t>
             </a:fld>
             <a:endParaRPr lang="en-NL"/>
           </a:p>
@@ -1378,6 +1379,99 @@
           <p:cNvPr id="2" name="Title 1" hidden="1">
             <a:extLst>
               <a:ext uri="{FF2B5EF4-FFF2-40B4-BE49-F238E27FC236}">
+                <a16:creationId xmlns:a16="http://schemas.microsoft.com/office/drawing/2014/main" id="{A3862D7D-2613-3F9B-9769-8963F27BD131}"/>
+              </a:ext>
+            </a:extLst>
+          </p:cNvPr>
+          <p:cNvSpPr>
+            <a:spLocks noGrp="1"/>
+          </p:cNvSpPr>
+          <p:nvPr>
+            <p:ph type="title"/>
+          </p:nvPr>
+        </p:nvSpPr>
+        <p:spPr/>
+        <p:txBody>
+          <a:bodyPr/>
+          <a:lstStyle/>
+          <a:p>
+            <a:r>
+              <a:rPr lang="en-US"/>
+              <a:t>Causes of problems</a:t>
+            </a:r>
+            <a:endParaRPr lang="en-NL" dirty="0"/>
+          </a:p>
+        </p:txBody>
+      </p:sp>
+      <p:pic>
+        <p:nvPicPr>
+          <p:cNvPr id="3" name="Picture 2">
+            <a:extLst>
+              <a:ext uri="{FF2B5EF4-FFF2-40B4-BE49-F238E27FC236}">
+                <a16:creationId xmlns:a16="http://schemas.microsoft.com/office/drawing/2014/main" id="{78D36B7A-954C-C14E-18F1-4D4D0F533FB1}"/>
+              </a:ext>
+            </a:extLst>
+          </p:cNvPr>
+          <p:cNvPicPr/>
+          <p:nvPr/>
+        </p:nvPicPr>
+        <p:blipFill>
+          <a:blip r:embed="rId3"/>
+          <a:stretch>
+            <a:fillRect/>
+          </a:stretch>
+        </p:blipFill>
+        <p:spPr>
+          <a:xfrm>
+            <a:off x="0" y="0"/>
+            <a:ext cx="12192000" cy="6858000"/>
+          </a:xfrm>
+          <a:prstGeom prst="rect">
+            <a:avLst/>
+          </a:prstGeom>
+        </p:spPr>
+      </p:pic>
+    </p:spTree>
+    <p:extLst>
+      <p:ext uri="{BB962C8B-B14F-4D97-AF65-F5344CB8AC3E}">
+        <p14:creationId xmlns:p14="http://schemas.microsoft.com/office/powerpoint/2010/main" val="680026398"/>
+      </p:ext>
+    </p:extLst>
+  </p:cSld>
+  <p:clrMapOvr>
+    <a:masterClrMapping/>
+  </p:clrMapOvr>
+</p:sld>
+</file>
+
+<file path=ppt/slides/slide11.xml><?xml version="1.0" encoding="utf-8"?>
+<p:sld xmlns:a="http://schemas.openxmlformats.org/drawingml/2006/main" xmlns:r="http://schemas.openxmlformats.org/officeDocument/2006/relationships" xmlns:p="http://schemas.openxmlformats.org/presentationml/2006/main">
+  <p:cSld>
+    <p:bg>
+      <p:bgPr>
+        <a:noFill/>
+        <a:effectLst/>
+      </p:bgPr>
+    </p:bg>
+    <p:spTree>
+      <p:nvGrpSpPr>
+        <p:cNvPr id="1" name=""/>
+        <p:cNvGrpSpPr/>
+        <p:nvPr/>
+      </p:nvGrpSpPr>
+      <p:grpSpPr>
+        <a:xfrm>
+          <a:off x="0" y="0"/>
+          <a:ext cx="0" cy="0"/>
+          <a:chOff x="0" y="0"/>
+          <a:chExt cx="0" cy="0"/>
+        </a:xfrm>
+      </p:grpSpPr>
+      <p:sp>
+        <p:nvSpPr>
+          <p:cNvPr id="2" name="Title 1" hidden="1">
+            <a:extLst>
+              <a:ext uri="{FF2B5EF4-FFF2-40B4-BE49-F238E27FC236}">
                 <a16:creationId xmlns:a16="http://schemas.microsoft.com/office/drawing/2014/main" id="{F0DECB97-8187-CC3C-14AE-98F3B4BA3047}"/>
               </a:ext>
             </a:extLst>
@@ -1443,7 +1537,7 @@
 </p:sld>
 </file>
 
-<file path=ppt/slides/slide11.xml><?xml version="1.0" encoding="utf-8"?>
+<file path=ppt/slides/slide12.xml><?xml version="1.0" encoding="utf-8"?>
 <p:sld xmlns:a="http://schemas.openxmlformats.org/drawingml/2006/main" xmlns:r="http://schemas.openxmlformats.org/officeDocument/2006/relationships" xmlns:p="http://schemas.openxmlformats.org/presentationml/2006/main">
   <p:cSld>
     <p:bg>
@@ -3546,6 +3640,36 @@
           </a:fontRef>
         </p:style>
       </p:cxnSp>
+      <p:pic>
+        <p:nvPicPr>
+          <p:cNvPr id="5" name="Picture 4">
+            <a:extLst>
+              <a:ext uri="{FF2B5EF4-FFF2-40B4-BE49-F238E27FC236}">
+                <a16:creationId xmlns:a16="http://schemas.microsoft.com/office/drawing/2014/main" id="{A21ACAC5-A5B7-58E5-07E9-88B9E925D8DF}"/>
+              </a:ext>
+            </a:extLst>
+          </p:cNvPr>
+          <p:cNvPicPr>
+            <a:picLocks noChangeAspect="1"/>
+          </p:cNvPicPr>
+          <p:nvPr/>
+        </p:nvPicPr>
+        <p:blipFill>
+          <a:blip r:embed="rId2"/>
+          <a:stretch>
+            <a:fillRect/>
+          </a:stretch>
+        </p:blipFill>
+        <p:spPr>
+          <a:xfrm>
+            <a:off x="321564" y="320040"/>
+            <a:ext cx="5136808" cy="6217920"/>
+          </a:xfrm>
+          <a:prstGeom prst="rect">
+            <a:avLst/>
+          </a:prstGeom>
+        </p:spPr>
+      </p:pic>
     </p:spTree>
     <p:extLst>
       <p:ext uri="{BB962C8B-B14F-4D97-AF65-F5344CB8AC3E}">
@@ -3560,6 +3684,198 @@
 </file>
 
 <file path=ppt/slides/slide8.xml><?xml version="1.0" encoding="utf-8"?>
+<p:sld xmlns:a="http://schemas.openxmlformats.org/drawingml/2006/main" xmlns:r="http://schemas.openxmlformats.org/officeDocument/2006/relationships" xmlns:p="http://schemas.openxmlformats.org/presentationml/2006/main">
+  <p:cSld>
+    <p:bg>
+      <p:bgPr>
+        <a:solidFill>
+          <a:schemeClr val="bg1">
+            <a:tint val="95000"/>
+            <a:satMod val="170000"/>
+          </a:schemeClr>
+        </a:solidFill>
+        <a:effectLst/>
+      </p:bgPr>
+    </p:bg>
+    <p:spTree>
+      <p:nvGrpSpPr>
+        <p:cNvPr id="1" name=""/>
+        <p:cNvGrpSpPr/>
+        <p:nvPr/>
+      </p:nvGrpSpPr>
+      <p:grpSpPr>
+        <a:xfrm>
+          <a:off x="0" y="0"/>
+          <a:ext cx="0" cy="0"/>
+          <a:chOff x="0" y="0"/>
+          <a:chExt cx="0" cy="0"/>
+        </a:xfrm>
+      </p:grpSpPr>
+      <p:sp>
+        <p:nvSpPr>
+          <p:cNvPr id="2" name="Title 1">
+            <a:extLst>
+              <a:ext uri="{FF2B5EF4-FFF2-40B4-BE49-F238E27FC236}">
+                <a16:creationId xmlns:a16="http://schemas.microsoft.com/office/drawing/2014/main" id="{6C38C380-5BEB-E3B9-E1C3-2A61334E8C0E}"/>
+              </a:ext>
+            </a:extLst>
+          </p:cNvPr>
+          <p:cNvSpPr>
+            <a:spLocks noGrp="1"/>
+          </p:cNvSpPr>
+          <p:nvPr>
+            <p:ph type="title"/>
+          </p:nvPr>
+        </p:nvSpPr>
+        <p:spPr>
+          <a:xfrm>
+            <a:off x="160774" y="4679311"/>
+            <a:ext cx="6159542" cy="1207269"/>
+          </a:xfrm>
+        </p:spPr>
+        <p:txBody>
+          <a:bodyPr vert="horz" lIns="91440" tIns="45720" rIns="91440" bIns="45720" rtlCol="0" anchor="b">
+            <a:normAutofit/>
+          </a:bodyPr>
+          <a:lstStyle/>
+          <a:p>
+            <a:pPr algn="ctr"/>
+            <a:r>
+              <a:rPr lang="en-US" sz="6000" dirty="0"/>
+              <a:t>End result</a:t>
+            </a:r>
+          </a:p>
+        </p:txBody>
+      </p:sp>
+      <p:pic>
+        <p:nvPicPr>
+          <p:cNvPr id="4" name="Picture 3">
+            <a:extLst>
+              <a:ext uri="{FF2B5EF4-FFF2-40B4-BE49-F238E27FC236}">
+                <a16:creationId xmlns:a16="http://schemas.microsoft.com/office/drawing/2014/main" id="{68EE36CA-B5F3-48EA-6442-F1F5170A2ECE}"/>
+              </a:ext>
+            </a:extLst>
+          </p:cNvPr>
+          <p:cNvPicPr>
+            <a:picLocks noChangeAspect="1"/>
+          </p:cNvPicPr>
+          <p:nvPr/>
+        </p:nvPicPr>
+        <p:blipFill>
+          <a:blip r:embed="rId2"/>
+          <a:stretch>
+            <a:fillRect/>
+          </a:stretch>
+        </p:blipFill>
+        <p:spPr>
+          <a:xfrm>
+            <a:off x="321734" y="547777"/>
+            <a:ext cx="5458816" cy="3532173"/>
+          </a:xfrm>
+          <a:prstGeom prst="rect">
+            <a:avLst/>
+          </a:prstGeom>
+        </p:spPr>
+      </p:pic>
+      <p:cxnSp>
+        <p:nvCxnSpPr>
+          <p:cNvPr id="28" name="Straight Connector 27">
+            <a:extLst>
+              <a:ext uri="{FF2B5EF4-FFF2-40B4-BE49-F238E27FC236}">
+                <a16:creationId xmlns:a16="http://schemas.microsoft.com/office/drawing/2014/main" id="{3D83F26F-C55B-4A92-9AFF-4894D14E27C5}"/>
+              </a:ext>
+              <a:ext uri="{C183D7F6-B498-43B3-948B-1728B52AA6E4}">
+                <adec:decorative xmlns:adec="http://schemas.microsoft.com/office/drawing/2017/decorative" val="1"/>
+              </a:ext>
+            </a:extLst>
+          </p:cNvPr>
+          <p:cNvCxnSpPr>
+            <a:cxnSpLocks noGrp="1" noRot="1" noChangeAspect="1" noMove="1" noResize="1" noEditPoints="1" noAdjustHandles="1" noChangeArrowheads="1" noChangeShapeType="1"/>
+          </p:cNvCxnSpPr>
+          <p:nvPr>
+            <p:extLst>
+              <p:ext uri="{386F3935-93C4-4BCD-93E2-E3B085C9AB24}">
+                <p16:designElem xmlns:p16="http://schemas.microsoft.com/office/powerpoint/2015/main" val="1"/>
+              </p:ext>
+            </p:extLst>
+          </p:nvPr>
+        </p:nvCxnSpPr>
+        <p:spPr>
+          <a:xfrm>
+            <a:off x="6096000" y="1253414"/>
+            <a:ext cx="0" cy="2120900"/>
+          </a:xfrm>
+          <a:prstGeom prst="line">
+            <a:avLst/>
+          </a:prstGeom>
+          <a:ln w="19050">
+            <a:solidFill>
+              <a:schemeClr val="tx1">
+                <a:lumMod val="75000"/>
+                <a:lumOff val="25000"/>
+              </a:schemeClr>
+            </a:solidFill>
+          </a:ln>
+        </p:spPr>
+        <p:style>
+          <a:lnRef idx="1">
+            <a:schemeClr val="accent1"/>
+          </a:lnRef>
+          <a:fillRef idx="0">
+            <a:schemeClr val="accent1"/>
+          </a:fillRef>
+          <a:effectRef idx="0">
+            <a:schemeClr val="accent1"/>
+          </a:effectRef>
+          <a:fontRef idx="minor">
+            <a:schemeClr val="tx1"/>
+          </a:fontRef>
+        </p:style>
+      </p:cxnSp>
+      <p:pic>
+        <p:nvPicPr>
+          <p:cNvPr id="5" name="Picture 4">
+            <a:extLst>
+              <a:ext uri="{FF2B5EF4-FFF2-40B4-BE49-F238E27FC236}">
+                <a16:creationId xmlns:a16="http://schemas.microsoft.com/office/drawing/2014/main" id="{14C04924-6DB2-A120-8DAF-8E49C7D8A049}"/>
+              </a:ext>
+            </a:extLst>
+          </p:cNvPr>
+          <p:cNvPicPr>
+            <a:picLocks noChangeAspect="1"/>
+          </p:cNvPicPr>
+          <p:nvPr/>
+        </p:nvPicPr>
+        <p:blipFill>
+          <a:blip r:embed="rId3"/>
+          <a:stretch>
+            <a:fillRect/>
+          </a:stretch>
+        </p:blipFill>
+        <p:spPr>
+          <a:xfrm>
+            <a:off x="6096000" y="351230"/>
+            <a:ext cx="5754601" cy="5754601"/>
+          </a:xfrm>
+          <a:prstGeom prst="rect">
+            <a:avLst/>
+          </a:prstGeom>
+        </p:spPr>
+      </p:pic>
+    </p:spTree>
+    <p:extLst>
+      <p:ext uri="{BB962C8B-B14F-4D97-AF65-F5344CB8AC3E}">
+        <p14:creationId xmlns:p14="http://schemas.microsoft.com/office/powerpoint/2010/main" val="2528039383"/>
+      </p:ext>
+    </p:extLst>
+  </p:cSld>
+  <p:clrMapOvr>
+    <a:overrideClrMapping bg1="dk1" tx1="lt1" bg2="dk2" tx2="lt2" accent1="accent1" accent2="accent2" accent3="accent3" accent4="accent4" accent5="accent5" accent6="accent6" hlink="hlink" folHlink="folHlink"/>
+  </p:clrMapOvr>
+</p:sld>
+</file>
+
+<file path=ppt/slides/slide9.xml><?xml version="1.0" encoding="utf-8"?>
 <p:sld xmlns:a="http://schemas.openxmlformats.org/drawingml/2006/main" xmlns:r="http://schemas.openxmlformats.org/officeDocument/2006/relationships" xmlns:p="http://schemas.openxmlformats.org/presentationml/2006/main">
   <p:cSld>
     <p:bg>
@@ -3714,99 +4030,6 @@
     <p:extLst>
       <p:ext uri="{BB962C8B-B14F-4D97-AF65-F5344CB8AC3E}">
         <p14:creationId xmlns:p14="http://schemas.microsoft.com/office/powerpoint/2010/main" val="2875166925"/>
-      </p:ext>
-    </p:extLst>
-  </p:cSld>
-  <p:clrMapOvr>
-    <a:masterClrMapping/>
-  </p:clrMapOvr>
-</p:sld>
-</file>
-
-<file path=ppt/slides/slide9.xml><?xml version="1.0" encoding="utf-8"?>
-<p:sld xmlns:a="http://schemas.openxmlformats.org/drawingml/2006/main" xmlns:r="http://schemas.openxmlformats.org/officeDocument/2006/relationships" xmlns:p="http://schemas.openxmlformats.org/presentationml/2006/main">
-  <p:cSld>
-    <p:bg>
-      <p:bgPr>
-        <a:noFill/>
-        <a:effectLst/>
-      </p:bgPr>
-    </p:bg>
-    <p:spTree>
-      <p:nvGrpSpPr>
-        <p:cNvPr id="1" name=""/>
-        <p:cNvGrpSpPr/>
-        <p:nvPr/>
-      </p:nvGrpSpPr>
-      <p:grpSpPr>
-        <a:xfrm>
-          <a:off x="0" y="0"/>
-          <a:ext cx="0" cy="0"/>
-          <a:chOff x="0" y="0"/>
-          <a:chExt cx="0" cy="0"/>
-        </a:xfrm>
-      </p:grpSpPr>
-      <p:sp>
-        <p:nvSpPr>
-          <p:cNvPr id="2" name="Title 1" hidden="1">
-            <a:extLst>
-              <a:ext uri="{FF2B5EF4-FFF2-40B4-BE49-F238E27FC236}">
-                <a16:creationId xmlns:a16="http://schemas.microsoft.com/office/drawing/2014/main" id="{A3862D7D-2613-3F9B-9769-8963F27BD131}"/>
-              </a:ext>
-            </a:extLst>
-          </p:cNvPr>
-          <p:cNvSpPr>
-            <a:spLocks noGrp="1"/>
-          </p:cNvSpPr>
-          <p:nvPr>
-            <p:ph type="title"/>
-          </p:nvPr>
-        </p:nvSpPr>
-        <p:spPr/>
-        <p:txBody>
-          <a:bodyPr/>
-          <a:lstStyle/>
-          <a:p>
-            <a:r>
-              <a:rPr lang="en-US"/>
-              <a:t>Causes of problems</a:t>
-            </a:r>
-            <a:endParaRPr lang="en-NL" dirty="0"/>
-          </a:p>
-        </p:txBody>
-      </p:sp>
-      <p:pic>
-        <p:nvPicPr>
-          <p:cNvPr id="3" name="Picture 2">
-            <a:extLst>
-              <a:ext uri="{FF2B5EF4-FFF2-40B4-BE49-F238E27FC236}">
-                <a16:creationId xmlns:a16="http://schemas.microsoft.com/office/drawing/2014/main" id="{78D36B7A-954C-C14E-18F1-4D4D0F533FB1}"/>
-              </a:ext>
-            </a:extLst>
-          </p:cNvPr>
-          <p:cNvPicPr/>
-          <p:nvPr/>
-        </p:nvPicPr>
-        <p:blipFill>
-          <a:blip r:embed="rId3"/>
-          <a:stretch>
-            <a:fillRect/>
-          </a:stretch>
-        </p:blipFill>
-        <p:spPr>
-          <a:xfrm>
-            <a:off x="0" y="0"/>
-            <a:ext cx="12192000" cy="6858000"/>
-          </a:xfrm>
-          <a:prstGeom prst="rect">
-            <a:avLst/>
-          </a:prstGeom>
-        </p:spPr>
-      </p:pic>
-    </p:spTree>
-    <p:extLst>
-      <p:ext uri="{BB962C8B-B14F-4D97-AF65-F5344CB8AC3E}">
-        <p14:creationId xmlns:p14="http://schemas.microsoft.com/office/powerpoint/2010/main" val="680026398"/>
       </p:ext>
     </p:extLst>
   </p:cSld>

</xml_diff>